<commit_message>
fixed small comments, also property chain issues in oboe-context --- not sure what happened
</commit_message>
<xml_diff>
--- a/docs/oboe-design-patterns.pptx
+++ b/docs/oboe-design-patterns.pptx
@@ -8,8 +8,10 @@
     <p:sldId id="256" r:id="rId2"/>
     <p:sldId id="257" r:id="rId3"/>
     <p:sldId id="267" r:id="rId4"/>
-    <p:sldId id="273" r:id="rId5"/>
-    <p:sldId id="260" r:id="rId6"/>
+    <p:sldId id="274" r:id="rId5"/>
+    <p:sldId id="275" r:id="rId6"/>
+    <p:sldId id="273" r:id="rId7"/>
+    <p:sldId id="260" r:id="rId8"/>
   </p:sldIdLst>
   <p:sldSz cx="9144000" cy="6858000" type="screen4x3"/>
   <p:notesSz cx="6858000" cy="9144000"/>
@@ -313,7 +315,7 @@
             <a:fld id="{1D018B56-9006-0B47-A5E8-4FDD23952970}" type="datetimeFigureOut">
               <a:rPr lang="en-US" smtClean="0"/>
               <a:pPr/>
-              <a:t>6/11/10</a:t>
+              <a:t>6/13/10</a:t>
             </a:fld>
             <a:endParaRPr lang="en-US"/>
           </a:p>
@@ -504,7 +506,7 @@
             <a:fld id="{1D018B56-9006-0B47-A5E8-4FDD23952970}" type="datetimeFigureOut">
               <a:rPr lang="en-US" smtClean="0"/>
               <a:pPr/>
-              <a:t>6/11/10</a:t>
+              <a:t>6/13/10</a:t>
             </a:fld>
             <a:endParaRPr lang="en-US"/>
           </a:p>
@@ -705,7 +707,7 @@
             <a:fld id="{1D018B56-9006-0B47-A5E8-4FDD23952970}" type="datetimeFigureOut">
               <a:rPr lang="en-US" smtClean="0"/>
               <a:pPr/>
-              <a:t>6/11/10</a:t>
+              <a:t>6/13/10</a:t>
             </a:fld>
             <a:endParaRPr lang="en-US"/>
           </a:p>
@@ -896,7 +898,7 @@
             <a:fld id="{1D018B56-9006-0B47-A5E8-4FDD23952970}" type="datetimeFigureOut">
               <a:rPr lang="en-US" smtClean="0"/>
               <a:pPr/>
-              <a:t>6/11/10</a:t>
+              <a:t>6/13/10</a:t>
             </a:fld>
             <a:endParaRPr lang="en-US"/>
           </a:p>
@@ -1163,7 +1165,7 @@
             <a:fld id="{1D018B56-9006-0B47-A5E8-4FDD23952970}" type="datetimeFigureOut">
               <a:rPr lang="en-US" smtClean="0"/>
               <a:pPr/>
-              <a:t>6/11/10</a:t>
+              <a:t>6/13/10</a:t>
             </a:fld>
             <a:endParaRPr lang="en-US"/>
           </a:p>
@@ -1472,7 +1474,7 @@
             <a:fld id="{1D018B56-9006-0B47-A5E8-4FDD23952970}" type="datetimeFigureOut">
               <a:rPr lang="en-US" smtClean="0"/>
               <a:pPr/>
-              <a:t>6/11/10</a:t>
+              <a:t>6/13/10</a:t>
             </a:fld>
             <a:endParaRPr lang="en-US"/>
           </a:p>
@@ -1915,7 +1917,7 @@
             <a:fld id="{1D018B56-9006-0B47-A5E8-4FDD23952970}" type="datetimeFigureOut">
               <a:rPr lang="en-US" smtClean="0"/>
               <a:pPr/>
-              <a:t>6/11/10</a:t>
+              <a:t>6/13/10</a:t>
             </a:fld>
             <a:endParaRPr lang="en-US"/>
           </a:p>
@@ -2054,7 +2056,7 @@
             <a:fld id="{1D018B56-9006-0B47-A5E8-4FDD23952970}" type="datetimeFigureOut">
               <a:rPr lang="en-US" smtClean="0"/>
               <a:pPr/>
-              <a:t>6/11/10</a:t>
+              <a:t>6/13/10</a:t>
             </a:fld>
             <a:endParaRPr lang="en-US"/>
           </a:p>
@@ -2170,7 +2172,7 @@
             <a:fld id="{1D018B56-9006-0B47-A5E8-4FDD23952970}" type="datetimeFigureOut">
               <a:rPr lang="en-US" smtClean="0"/>
               <a:pPr/>
-              <a:t>6/11/10</a:t>
+              <a:t>6/13/10</a:t>
             </a:fld>
             <a:endParaRPr lang="en-US"/>
           </a:p>
@@ -2468,7 +2470,7 @@
             <a:fld id="{1D018B56-9006-0B47-A5E8-4FDD23952970}" type="datetimeFigureOut">
               <a:rPr lang="en-US" smtClean="0"/>
               <a:pPr/>
-              <a:t>6/11/10</a:t>
+              <a:t>6/13/10</a:t>
             </a:fld>
             <a:endParaRPr lang="en-US"/>
           </a:p>
@@ -2742,7 +2744,7 @@
             <a:fld id="{1D018B56-9006-0B47-A5E8-4FDD23952970}" type="datetimeFigureOut">
               <a:rPr lang="en-US" smtClean="0"/>
               <a:pPr/>
-              <a:t>6/11/10</a:t>
+              <a:t>6/13/10</a:t>
             </a:fld>
             <a:endParaRPr lang="en-US"/>
           </a:p>
@@ -3230,8 +3232,8 @@
         </p:nvSpPr>
         <p:spPr>
           <a:xfrm>
-            <a:off x="609600" y="990600"/>
-            <a:ext cx="8305800" cy="2765425"/>
+            <a:off x="152400" y="990600"/>
+            <a:ext cx="8991600" cy="2765425"/>
           </a:xfrm>
         </p:spPr>
         <p:txBody>
@@ -3241,14 +3243,19 @@
             <a:pPr algn="ctr"/>
             <a:r>
               <a:rPr lang="en-US" sz="3600" dirty="0" smtClean="0"/>
-              <a:t>Design Guidelines for Defining </a:t>
-            </a:r>
-            <a:br>
+              <a:t>Design Patterns and Conventions for </a:t>
+            </a:r>
+            <a:r>
               <a:rPr lang="en-US" sz="3600" dirty="0" smtClean="0"/>
-            </a:br>
+              <a:t>Defining</a:t>
+            </a:r>
             <a:r>
               <a:rPr lang="en-US" sz="3600" dirty="0" smtClean="0"/>
-              <a:t>OBOE-Compatible Domain </a:t>
+              <a:t> OBOE</a:t>
+            </a:r>
+            <a:r>
+              <a:rPr lang="en-US" sz="3600" dirty="0" smtClean="0"/>
+              <a:t>-Compatible Domain </a:t>
             </a:r>
             <a:r>
               <a:rPr lang="en-US" sz="3600" dirty="0" err="1" smtClean="0"/>
@@ -3328,21 +3335,7 @@
                 <a:latin typeface="Calibri"/>
                 <a:cs typeface="Calibri"/>
               </a:rPr>
-              <a:t>Based on OBOE</a:t>
-            </a:r>
-            <a:r>
-              <a:rPr lang="en-US" dirty="0" smtClean="0">
-                <a:latin typeface="Calibri"/>
-                <a:cs typeface="Calibri"/>
-              </a:rPr>
-              <a:t> 1.0, </a:t>
-            </a:r>
-            <a:r>
-              <a:rPr lang="en-US" dirty="0" smtClean="0">
-                <a:latin typeface="Calibri"/>
-                <a:cs typeface="Calibri"/>
-              </a:rPr>
-              <a:t>June, 2010</a:t>
+              <a:t>Based on OBOE 1.0, June, 2010</a:t>
             </a:r>
             <a:endParaRPr lang="en-US" dirty="0">
               <a:latin typeface="Calibri"/>
@@ -3432,7 +3425,11 @@
             </a:pPr>
             <a:r>
               <a:rPr lang="en-US" dirty="0" smtClean="0"/>
-              <a:t>Basic OBOE structure</a:t>
+              <a:t>Basic </a:t>
+            </a:r>
+            <a:r>
+              <a:rPr lang="en-US" dirty="0" smtClean="0"/>
+              <a:t>OBOE structure</a:t>
             </a:r>
             <a:endParaRPr lang="en-US" dirty="0" smtClean="0"/>
           </a:p>
@@ -3446,9 +3443,8 @@
             </a:pPr>
             <a:r>
               <a:rPr lang="en-US" dirty="0" smtClean="0"/>
-              <a:t>Characteristics and Entities</a:t>
-            </a:r>
-            <a:endParaRPr lang="en-US" dirty="0" smtClean="0"/>
+              <a:t>Basic Conventions</a:t>
+            </a:r>
           </a:p>
           <a:p>
             <a:pPr marL="514350" indent="-514350">
@@ -3460,13 +3456,12 @@
             </a:pPr>
             <a:r>
               <a:rPr lang="en-US" dirty="0" smtClean="0"/>
-              <a:t>Measurement </a:t>
+              <a:t>Characteristics </a:t>
             </a:r>
             <a:r>
               <a:rPr lang="en-US" dirty="0" smtClean="0"/>
-              <a:t>standards and units</a:t>
-            </a:r>
-            <a:endParaRPr lang="en-US" dirty="0" smtClean="0"/>
+              <a:t>and Entities</a:t>
+            </a:r>
           </a:p>
           <a:p>
             <a:pPr marL="514350" indent="-514350">
@@ -3478,11 +3473,7 @@
             </a:pPr>
             <a:r>
               <a:rPr lang="en-US" dirty="0" smtClean="0"/>
-              <a:t>Measurement </a:t>
-            </a:r>
-            <a:r>
-              <a:rPr lang="en-US" dirty="0" smtClean="0"/>
-              <a:t>types</a:t>
+              <a:t>Measurement standards and units</a:t>
             </a:r>
           </a:p>
           <a:p>
@@ -3495,7 +3486,7 @@
             </a:pPr>
             <a:r>
               <a:rPr lang="en-US" dirty="0" smtClean="0"/>
-              <a:t>Context relationships</a:t>
+              <a:t>Measurement types</a:t>
             </a:r>
           </a:p>
           <a:p>
@@ -3508,9 +3499,21 @@
             </a:pPr>
             <a:r>
               <a:rPr lang="en-US" dirty="0" smtClean="0"/>
+              <a:t>Context relationships</a:t>
+            </a:r>
+          </a:p>
+          <a:p>
+            <a:pPr marL="514350" indent="-514350">
+              <a:spcAft>
+                <a:spcPts val="1200"/>
+              </a:spcAft>
+              <a:buFont typeface="+mj-lt"/>
+              <a:buAutoNum type="arabicPeriod"/>
+            </a:pPr>
+            <a:r>
+              <a:rPr lang="en-US" dirty="0" smtClean="0"/>
               <a:t>Individuals</a:t>
             </a:r>
-            <a:endParaRPr lang="en-US" dirty="0" smtClean="0"/>
           </a:p>
           <a:p>
             <a:pPr marL="514350" indent="-514350">
@@ -3887,6 +3890,55 @@
                       </p:childTnLst>
                     </p:cTn>
                   </p:par>
+                  <p:par>
+                    <p:cTn id="31" fill="hold">
+                      <p:stCondLst>
+                        <p:cond delay="indefinite"/>
+                      </p:stCondLst>
+                      <p:childTnLst>
+                        <p:par>
+                          <p:cTn id="32" fill="hold">
+                            <p:stCondLst>
+                              <p:cond delay="0"/>
+                            </p:stCondLst>
+                            <p:childTnLst>
+                              <p:par>
+                                <p:cTn id="33" presetID="1" presetClass="entr" presetSubtype="0" fill="hold" grpId="0" nodeType="clickEffect">
+                                  <p:stCondLst>
+                                    <p:cond delay="0"/>
+                                  </p:stCondLst>
+                                  <p:childTnLst>
+                                    <p:set>
+                                      <p:cBhvr>
+                                        <p:cTn id="34" dur="1" fill="hold">
+                                          <p:stCondLst>
+                                            <p:cond delay="0"/>
+                                          </p:stCondLst>
+                                        </p:cTn>
+                                        <p:tgtEl>
+                                          <p:spTgt spid="3">
+                                            <p:txEl>
+                                              <p:pRg st="7" end="7"/>
+                                            </p:txEl>
+                                          </p:spTgt>
+                                        </p:tgtEl>
+                                        <p:attrNameLst>
+                                          <p:attrName>style.visibility</p:attrName>
+                                        </p:attrNameLst>
+                                      </p:cBhvr>
+                                      <p:to>
+                                        <p:strVal val="visible"/>
+                                      </p:to>
+                                    </p:set>
+                                  </p:childTnLst>
+                                </p:cTn>
+                              </p:par>
+                            </p:childTnLst>
+                          </p:cTn>
+                        </p:par>
+                      </p:childTnLst>
+                    </p:cTn>
+                  </p:par>
                 </p:childTnLst>
               </p:cTn>
               <p:prevCondLst>
@@ -3949,11 +4001,7 @@
           <a:p>
             <a:r>
               <a:rPr lang="en-US" dirty="0" smtClean="0"/>
-              <a:t>1. Basic OBOE structure</a:t>
-            </a:r>
-            <a:r>
-              <a:rPr lang="en-US" dirty="0" smtClean="0"/>
-              <a:t> (oboe-core)</a:t>
+              <a:t>1. Basic OBOE structure (oboe-core)</a:t>
             </a:r>
             <a:endParaRPr lang="en-US" dirty="0"/>
           </a:p>
@@ -5787,6 +5835,273 @@
           <a:p>
             <a:r>
               <a:rPr lang="en-US" dirty="0" smtClean="0"/>
+              <a:t>2. Basic Conventions</a:t>
+            </a:r>
+            <a:endParaRPr lang="en-US" dirty="0"/>
+          </a:p>
+        </p:txBody>
+      </p:sp>
+      <p:sp>
+        <p:nvSpPr>
+          <p:cNvPr id="3" name="Content Placeholder 2"/>
+          <p:cNvSpPr>
+            <a:spLocks noGrp="1"/>
+          </p:cNvSpPr>
+          <p:nvPr>
+            <p:ph idx="1"/>
+          </p:nvPr>
+        </p:nvSpPr>
+        <p:spPr/>
+        <p:txBody>
+          <a:bodyPr/>
+          <a:lstStyle/>
+          <a:p>
+            <a:r>
+              <a:rPr lang="en-US" dirty="0" smtClean="0"/>
+              <a:t>The following conventions are used within the core oboe </a:t>
+            </a:r>
+            <a:r>
+              <a:rPr lang="en-US" dirty="0" err="1" smtClean="0"/>
+              <a:t>ontologies</a:t>
+            </a:r>
+            <a:r>
+              <a:rPr lang="en-US" dirty="0" smtClean="0"/>
+              <a:t>, and are suggested for oboe compatible </a:t>
+            </a:r>
+            <a:r>
+              <a:rPr lang="en-US" dirty="0" err="1" smtClean="0"/>
+              <a:t>ontologies</a:t>
+            </a:r>
+            <a:r>
+              <a:rPr lang="en-US" dirty="0" smtClean="0"/>
+              <a:t> (although not required)</a:t>
+            </a:r>
+          </a:p>
+          <a:p>
+            <a:pPr lvl="1"/>
+            <a:r>
+              <a:rPr lang="en-US" dirty="0" smtClean="0"/>
+              <a:t>Class names are capitalized (e.g., Plant, Height)</a:t>
+            </a:r>
+          </a:p>
+          <a:p>
+            <a:pPr lvl="1"/>
+            <a:r>
+              <a:rPr lang="en-US" dirty="0" smtClean="0"/>
+              <a:t>Each term in a name is capitalized (e.g., </a:t>
+            </a:r>
+            <a:r>
+              <a:rPr lang="en-US" dirty="0" err="1" smtClean="0"/>
+              <a:t>CarbonContent</a:t>
+            </a:r>
+            <a:r>
+              <a:rPr lang="en-US" dirty="0" smtClean="0"/>
+              <a:t>)</a:t>
+            </a:r>
+          </a:p>
+          <a:p>
+            <a:pPr lvl="1"/>
+            <a:r>
+              <a:rPr lang="en-US" dirty="0" smtClean="0"/>
+              <a:t>Each class has an </a:t>
+            </a:r>
+            <a:r>
+              <a:rPr lang="en-US" dirty="0" err="1" smtClean="0"/>
+              <a:t>rdfs:comment</a:t>
+            </a:r>
+            <a:r>
+              <a:rPr lang="en-US" dirty="0" smtClean="0"/>
+              <a:t> describing its meaning/scope</a:t>
+            </a:r>
+          </a:p>
+          <a:p>
+            <a:pPr lvl="1"/>
+            <a:r>
+              <a:rPr lang="en-US" dirty="0" err="1" smtClean="0"/>
+              <a:t>Ontologies</a:t>
+            </a:r>
+            <a:r>
+              <a:rPr lang="en-US" dirty="0" smtClean="0"/>
+              <a:t> have one distinguished </a:t>
+            </a:r>
+            <a:r>
+              <a:rPr lang="en-US" dirty="0" err="1" smtClean="0"/>
+              <a:t>rdfs:label</a:t>
+            </a:r>
+            <a:r>
+              <a:rPr lang="en-US" dirty="0" smtClean="0"/>
+              <a:t> (e.g., “oboe-units”)</a:t>
+            </a:r>
+          </a:p>
+          <a:p>
+            <a:pPr lvl="1"/>
+            <a:r>
+              <a:rPr lang="en-US" dirty="0" err="1" smtClean="0"/>
+              <a:t>Ontologies</a:t>
+            </a:r>
+            <a:r>
+              <a:rPr lang="en-US" dirty="0" smtClean="0"/>
+              <a:t> have an </a:t>
+            </a:r>
+            <a:r>
+              <a:rPr lang="en-US" dirty="0" err="1" smtClean="0"/>
+              <a:t>rdfs:comment</a:t>
+            </a:r>
+            <a:r>
+              <a:rPr lang="en-US" dirty="0" smtClean="0"/>
+              <a:t> describing its meaning and scope</a:t>
+            </a:r>
+          </a:p>
+          <a:p>
+            <a:pPr lvl="1"/>
+            <a:endParaRPr lang="en-US" dirty="0"/>
+          </a:p>
+        </p:txBody>
+      </p:sp>
+    </p:spTree>
+  </p:cSld>
+  <p:clrMapOvr>
+    <a:masterClrMapping/>
+  </p:clrMapOvr>
+</p:sld>
+</file>
+
+<file path=ppt/slides/slide5.xml><?xml version="1.0" encoding="utf-8"?>
+<p:sld xmlns:a="http://schemas.openxmlformats.org/drawingml/2006/main" xmlns:r="http://schemas.openxmlformats.org/officeDocument/2006/relationships" xmlns:mc="http://schemas.openxmlformats.org/markup-compatibility/2006" xmlns:mv="urn:schemas-microsoft-com:mac:vml" xmlns:p="http://schemas.openxmlformats.org/presentationml/2006/main" mc:Ignorable="mv" mc:PreserveAttributes="mv:*">
+  <p:cSld>
+    <p:spTree>
+      <p:nvGrpSpPr>
+        <p:cNvPr id="1" name=""/>
+        <p:cNvGrpSpPr/>
+        <p:nvPr/>
+      </p:nvGrpSpPr>
+      <p:grpSpPr>
+        <a:xfrm>
+          <a:off x="0" y="0"/>
+          <a:ext cx="0" cy="0"/>
+          <a:chOff x="0" y="0"/>
+          <a:chExt cx="0" cy="0"/>
+        </a:xfrm>
+      </p:grpSpPr>
+      <p:sp>
+        <p:nvSpPr>
+          <p:cNvPr id="2" name="Title 1"/>
+          <p:cNvSpPr>
+            <a:spLocks noGrp="1"/>
+          </p:cNvSpPr>
+          <p:nvPr>
+            <p:ph type="title"/>
+          </p:nvPr>
+        </p:nvSpPr>
+        <p:spPr/>
+        <p:txBody>
+          <a:bodyPr/>
+          <a:lstStyle/>
+          <a:p>
+            <a:r>
+              <a:rPr lang="en-US" dirty="0" smtClean="0"/>
+              <a:t>2. Basic Conventions</a:t>
+            </a:r>
+            <a:endParaRPr lang="en-US" dirty="0"/>
+          </a:p>
+        </p:txBody>
+      </p:sp>
+      <p:sp>
+        <p:nvSpPr>
+          <p:cNvPr id="3" name="Content Placeholder 2"/>
+          <p:cNvSpPr>
+            <a:spLocks noGrp="1"/>
+          </p:cNvSpPr>
+          <p:nvPr>
+            <p:ph idx="1"/>
+          </p:nvPr>
+        </p:nvSpPr>
+        <p:spPr/>
+        <p:txBody>
+          <a:bodyPr/>
+          <a:lstStyle/>
+          <a:p>
+            <a:r>
+              <a:rPr lang="en-US" dirty="0" smtClean="0"/>
+              <a:t>When naming entities, characteristics, and standards it is suggested they make sense in the following sentence … </a:t>
+            </a:r>
+          </a:p>
+          <a:p>
+            <a:pPr lvl="1"/>
+            <a:r>
+              <a:rPr lang="en-US" dirty="0" smtClean="0"/>
+              <a:t>The &lt;characteristic&gt; of an &lt;entity&gt; was measured </a:t>
+            </a:r>
+          </a:p>
+          <a:p>
+            <a:pPr lvl="1"/>
+            <a:r>
+              <a:rPr lang="en-US" dirty="0" smtClean="0"/>
+              <a:t>Etc. …</a:t>
+            </a:r>
+          </a:p>
+          <a:p>
+            <a:pPr lvl="1"/>
+            <a:r>
+              <a:rPr lang="en-US" dirty="0" smtClean="0"/>
+              <a:t>For example: …</a:t>
+            </a:r>
+          </a:p>
+          <a:p>
+            <a:pPr lvl="1"/>
+            <a:r>
+              <a:rPr lang="en-US" dirty="0" smtClean="0"/>
+              <a:t>Also include for context … </a:t>
+            </a:r>
+          </a:p>
+          <a:p>
+            <a:pPr lvl="1"/>
+            <a:endParaRPr lang="en-US" dirty="0"/>
+          </a:p>
+        </p:txBody>
+      </p:sp>
+    </p:spTree>
+  </p:cSld>
+  <p:clrMapOvr>
+    <a:masterClrMapping/>
+  </p:clrMapOvr>
+</p:sld>
+</file>
+
+<file path=ppt/slides/slide6.xml><?xml version="1.0" encoding="utf-8"?>
+<p:sld xmlns:a="http://schemas.openxmlformats.org/drawingml/2006/main" xmlns:r="http://schemas.openxmlformats.org/officeDocument/2006/relationships" xmlns:mc="http://schemas.openxmlformats.org/markup-compatibility/2006" xmlns:mv="urn:schemas-microsoft-com:mac:vml" xmlns:p="http://schemas.openxmlformats.org/presentationml/2006/main" mc:Ignorable="mv" mc:PreserveAttributes="mv:*">
+  <p:cSld>
+    <p:spTree>
+      <p:nvGrpSpPr>
+        <p:cNvPr id="1" name=""/>
+        <p:cNvGrpSpPr/>
+        <p:nvPr/>
+      </p:nvGrpSpPr>
+      <p:grpSpPr>
+        <a:xfrm>
+          <a:off x="0" y="0"/>
+          <a:ext cx="0" cy="0"/>
+          <a:chOff x="0" y="0"/>
+          <a:chExt cx="0" cy="0"/>
+        </a:xfrm>
+      </p:grpSpPr>
+      <p:sp>
+        <p:nvSpPr>
+          <p:cNvPr id="2" name="Title 1"/>
+          <p:cNvSpPr>
+            <a:spLocks noGrp="1"/>
+          </p:cNvSpPr>
+          <p:nvPr>
+            <p:ph type="title"/>
+          </p:nvPr>
+        </p:nvSpPr>
+        <p:spPr/>
+        <p:txBody>
+          <a:bodyPr/>
+          <a:lstStyle/>
+          <a:p>
+            <a:r>
+              <a:rPr lang="en-US" dirty="0" smtClean="0"/>
               <a:t>…</a:t>
             </a:r>
             <a:endParaRPr lang="en-US" dirty="0"/>
@@ -7218,7 +7533,7 @@
 </p:sld>
 </file>
 
-<file path=ppt/slides/slide5.xml><?xml version="1.0" encoding="utf-8"?>
+<file path=ppt/slides/slide7.xml><?xml version="1.0" encoding="utf-8"?>
 <p:sld xmlns:a="http://schemas.openxmlformats.org/drawingml/2006/main" xmlns:r="http://schemas.openxmlformats.org/officeDocument/2006/relationships" xmlns:mc="http://schemas.openxmlformats.org/markup-compatibility/2006" xmlns:mv="urn:schemas-microsoft-com:mac:vml" xmlns:p="http://schemas.openxmlformats.org/presentationml/2006/main" mc:Ignorable="mv" mc:PreserveAttributes="mv:*">
   <p:cSld>
     <p:spTree>

</xml_diff>